<commit_message>
diagrams: resolved discrepancies in Sequence Diagram for EditStudentCommand
</commit_message>
<xml_diff>
--- a/docs/diagrams/SDforEditStudentCommandLogicAndModel.pptx
+++ b/docs/diagrams/SDforEditStudentCommandLogicAndModel.pptx
@@ -261,7 +261,7 @@
           <a:p>
             <a:fld id="{7A26E73D-0704-41E2-A85C-9874C6C723E6}" type="datetimeFigureOut">
               <a:rPr lang="en-IN" smtClean="0"/>
-              <a:t>29-10-2018</a:t>
+              <a:t>10-11-2018</a:t>
             </a:fld>
             <a:endParaRPr lang="en-IN"/>
           </a:p>
@@ -461,7 +461,7 @@
           <a:p>
             <a:fld id="{7A26E73D-0704-41E2-A85C-9874C6C723E6}" type="datetimeFigureOut">
               <a:rPr lang="en-IN" smtClean="0"/>
-              <a:t>29-10-2018</a:t>
+              <a:t>10-11-2018</a:t>
             </a:fld>
             <a:endParaRPr lang="en-IN"/>
           </a:p>
@@ -671,7 +671,7 @@
           <a:p>
             <a:fld id="{7A26E73D-0704-41E2-A85C-9874C6C723E6}" type="datetimeFigureOut">
               <a:rPr lang="en-IN" smtClean="0"/>
-              <a:t>29-10-2018</a:t>
+              <a:t>10-11-2018</a:t>
             </a:fld>
             <a:endParaRPr lang="en-IN"/>
           </a:p>
@@ -871,7 +871,7 @@
           <a:p>
             <a:fld id="{7A26E73D-0704-41E2-A85C-9874C6C723E6}" type="datetimeFigureOut">
               <a:rPr lang="en-IN" smtClean="0"/>
-              <a:t>29-10-2018</a:t>
+              <a:t>10-11-2018</a:t>
             </a:fld>
             <a:endParaRPr lang="en-IN"/>
           </a:p>
@@ -1147,7 +1147,7 @@
           <a:p>
             <a:fld id="{7A26E73D-0704-41E2-A85C-9874C6C723E6}" type="datetimeFigureOut">
               <a:rPr lang="en-IN" smtClean="0"/>
-              <a:t>29-10-2018</a:t>
+              <a:t>10-11-2018</a:t>
             </a:fld>
             <a:endParaRPr lang="en-IN"/>
           </a:p>
@@ -1415,7 +1415,7 @@
           <a:p>
             <a:fld id="{7A26E73D-0704-41E2-A85C-9874C6C723E6}" type="datetimeFigureOut">
               <a:rPr lang="en-IN" smtClean="0"/>
-              <a:t>29-10-2018</a:t>
+              <a:t>10-11-2018</a:t>
             </a:fld>
             <a:endParaRPr lang="en-IN"/>
           </a:p>
@@ -1830,7 +1830,7 @@
           <a:p>
             <a:fld id="{7A26E73D-0704-41E2-A85C-9874C6C723E6}" type="datetimeFigureOut">
               <a:rPr lang="en-IN" smtClean="0"/>
-              <a:t>29-10-2018</a:t>
+              <a:t>10-11-2018</a:t>
             </a:fld>
             <a:endParaRPr lang="en-IN"/>
           </a:p>
@@ -1972,7 +1972,7 @@
           <a:p>
             <a:fld id="{7A26E73D-0704-41E2-A85C-9874C6C723E6}" type="datetimeFigureOut">
               <a:rPr lang="en-IN" smtClean="0"/>
-              <a:t>29-10-2018</a:t>
+              <a:t>10-11-2018</a:t>
             </a:fld>
             <a:endParaRPr lang="en-IN"/>
           </a:p>
@@ -2085,7 +2085,7 @@
           <a:p>
             <a:fld id="{7A26E73D-0704-41E2-A85C-9874C6C723E6}" type="datetimeFigureOut">
               <a:rPr lang="en-IN" smtClean="0"/>
-              <a:t>29-10-2018</a:t>
+              <a:t>10-11-2018</a:t>
             </a:fld>
             <a:endParaRPr lang="en-IN"/>
           </a:p>
@@ -2398,7 +2398,7 @@
           <a:p>
             <a:fld id="{7A26E73D-0704-41E2-A85C-9874C6C723E6}" type="datetimeFigureOut">
               <a:rPr lang="en-IN" smtClean="0"/>
-              <a:t>29-10-2018</a:t>
+              <a:t>10-11-2018</a:t>
             </a:fld>
             <a:endParaRPr lang="en-IN"/>
           </a:p>
@@ -2687,7 +2687,7 @@
           <a:p>
             <a:fld id="{7A26E73D-0704-41E2-A85C-9874C6C723E6}" type="datetimeFigureOut">
               <a:rPr lang="en-IN" smtClean="0"/>
-              <a:t>29-10-2018</a:t>
+              <a:t>10-11-2018</a:t>
             </a:fld>
             <a:endParaRPr lang="en-IN"/>
           </a:p>
@@ -2930,7 +2930,7 @@
           <a:p>
             <a:fld id="{7A26E73D-0704-41E2-A85C-9874C6C723E6}" type="datetimeFigureOut">
               <a:rPr lang="en-IN" smtClean="0"/>
-              <a:t>29-10-2018</a:t>
+              <a:t>10-11-2018</a:t>
             </a:fld>
             <a:endParaRPr lang="en-IN"/>
           </a:p>
@@ -3733,7 +3733,7 @@
         <p:spPr>
           <a:xfrm>
             <a:off x="3447895" y="1676605"/>
-            <a:ext cx="174929" cy="1129459"/>
+            <a:ext cx="174929" cy="1577198"/>
           </a:xfrm>
           <a:prstGeom prst="rect">
             <a:avLst/>
@@ -3964,7 +3964,7 @@
         </p:nvSpPr>
         <p:spPr>
           <a:xfrm>
-            <a:off x="4307261" y="3264559"/>
+            <a:off x="4322793" y="3790794"/>
             <a:ext cx="855809" cy="215444"/>
           </a:xfrm>
           <a:prstGeom prst="rect">
@@ -4054,7 +4054,7 @@
         </p:nvCxnSpPr>
         <p:spPr>
           <a:xfrm flipV="1">
-            <a:off x="1833491" y="2797740"/>
+            <a:off x="1833491" y="3235890"/>
             <a:ext cx="1596514" cy="5378"/>
           </a:xfrm>
           <a:prstGeom prst="straightConnector1">
@@ -4748,6 +4748,7 @@
             </a:extLst>
           </p:cNvPr>
           <p:cNvCxnSpPr>
+            <a:cxnSpLocks/>
             <a:stCxn id="38" idx="0"/>
           </p:cNvCxnSpPr>
           <p:nvPr/>
@@ -4755,7 +4756,7 @@
         <p:spPr>
           <a:xfrm>
             <a:off x="5326174" y="1907309"/>
-            <a:ext cx="0" cy="990600"/>
+            <a:ext cx="3732" cy="1451152"/>
           </a:xfrm>
           <a:prstGeom prst="line">
             <a:avLst/>
@@ -4797,8 +4798,8 @@
         </p:nvSpPr>
         <p:spPr>
           <a:xfrm>
-            <a:off x="5223252" y="2212110"/>
-            <a:ext cx="205843" cy="533400"/>
+            <a:off x="5223252" y="2212109"/>
+            <a:ext cx="205843" cy="829537"/>
           </a:xfrm>
           <a:prstGeom prst="rect">
             <a:avLst/>
@@ -4845,12 +4846,14 @@
               </a:ext>
             </a:extLst>
           </p:cNvPr>
-          <p:cNvCxnSpPr/>
+          <p:cNvCxnSpPr>
+            <a:cxnSpLocks/>
+          </p:cNvCxnSpPr>
           <p:nvPr/>
         </p:nvCxnSpPr>
         <p:spPr>
           <a:xfrm>
-            <a:off x="3662687" y="2739582"/>
+            <a:off x="3658955" y="3038028"/>
             <a:ext cx="1667219" cy="0"/>
           </a:xfrm>
           <a:prstGeom prst="straightConnector1">
@@ -5043,7 +5046,7 @@
         </p:blipFill>
         <p:spPr>
           <a:xfrm>
-            <a:off x="5212254" y="2856364"/>
+            <a:off x="5217067" y="3358461"/>
             <a:ext cx="246400" cy="246400"/>
           </a:xfrm>
           <a:prstGeom prst="rect">
@@ -5141,12 +5144,12 @@
         </p:nvCxnSpPr>
         <p:spPr>
           <a:xfrm flipV="1">
-            <a:off x="1833491" y="2982450"/>
-            <a:ext cx="6209309" cy="518436"/>
+            <a:off x="1805294" y="2996508"/>
+            <a:ext cx="6237477" cy="1038199"/>
           </a:xfrm>
           <a:prstGeom prst="bentConnector3">
             <a:avLst>
-              <a:gd name="adj1" fmla="val 74390"/>
+              <a:gd name="adj1" fmla="val 92656"/>
             </a:avLst>
           </a:prstGeom>
           <a:ln w="19050">
@@ -6058,6 +6061,52 @@
           <a:ln w="19050">
             <a:headEnd type="none" w="med" len="med"/>
             <a:tailEnd type="arrow" w="med" len="med"/>
+          </a:ln>
+        </p:spPr>
+        <p:style>
+          <a:lnRef idx="1">
+            <a:schemeClr val="accent1"/>
+          </a:lnRef>
+          <a:fillRef idx="0">
+            <a:schemeClr val="accent1"/>
+          </a:fillRef>
+          <a:effectRef idx="0">
+            <a:schemeClr val="accent1"/>
+          </a:effectRef>
+          <a:fontRef idx="minor">
+            <a:schemeClr val="tx1"/>
+          </a:fontRef>
+        </p:style>
+      </p:cxnSp>
+      <p:cxnSp>
+        <p:nvCxnSpPr>
+          <p:cNvPr id="61" name="Straight Arrow Connector 60">
+            <a:extLst>
+              <a:ext uri="{FF2B5EF4-FFF2-40B4-BE49-F238E27FC236}">
+                <a16:creationId xmlns:a16="http://schemas.microsoft.com/office/drawing/2014/main" id="{11865A91-E3E7-4245-8591-5BA7A17385BE}"/>
+              </a:ext>
+            </a:extLst>
+          </p:cNvPr>
+          <p:cNvCxnSpPr>
+            <a:cxnSpLocks/>
+          </p:cNvCxnSpPr>
+          <p:nvPr/>
+        </p:nvCxnSpPr>
+        <p:spPr>
+          <a:xfrm>
+            <a:off x="5429095" y="2874776"/>
+            <a:ext cx="2698130" cy="0"/>
+          </a:xfrm>
+          <a:prstGeom prst="straightConnector1">
+            <a:avLst/>
+          </a:prstGeom>
+          <a:ln w="19050">
+            <a:solidFill>
+              <a:srgbClr val="0070C0"/>
+            </a:solidFill>
+            <a:prstDash val="sysDash"/>
+            <a:headEnd type="arrow" w="med" len="med"/>
+            <a:tailEnd type="none" w="med" len="med"/>
           </a:ln>
         </p:spPr>
         <p:style>

</xml_diff>